<commit_message>
Added Test Back to Title
Added test
</commit_message>
<xml_diff>
--- a/Donohue Electronic Recycle.pptx
+++ b/Donohue Electronic Recycle.pptx
@@ -3927,7 +3927,11 @@
           <a:p>
             <a:r>
               <a:rPr lang="en-US" dirty="0" smtClean="0"/>
-              <a:t>Recycling Electronics</a:t>
+              <a:t>Recycling Test </a:t>
+            </a:r>
+            <a:r>
+              <a:rPr lang="en-US" dirty="0" smtClean="0"/>
+              <a:t>Electronics</a:t>
             </a:r>
             <a:endParaRPr dirty="0"/>
           </a:p>

</xml_diff>